<commit_message>
UseCaseTemplate dal 13 al 21 (19 e 20 solo abbozzati)
</commit_message>
<xml_diff>
--- a/docs/useCaseTemplate/UseCase 16_MandaSegnalazioni_Proprietrio.pptx
+++ b/docs/useCaseTemplate/UseCase 16_MandaSegnalazioni_Proprietrio.pptx
@@ -259,11 +259,475 @@
         </p15:guide>
       </p15:sldGuideLst>
     </p:ext>
-    <p:ext uri="http://customooxmlschemas.google.com/">
-      <go:slidesCustomData xmlns:go="http://customooxmlschemas.google.com/" r:id="rId11" roundtripDataSignature="AMtx7miEz0uhcBt4QbAFT/dHC+HoHDZAcQ=="/>
-    </p:ext>
   </p:extLst>
 </p:presentation>
+</file>
+
+<file path=ppt/presProps1.xml><?xml version="1.0" encoding="utf-8"?>
+<p:presentationPr xmlns:a="http://schemas.openxmlformats.org/drawingml/2006/main" xmlns:r="http://schemas.openxmlformats.org/officeDocument/2006/relationships" xmlns:mc="http://schemas.openxmlformats.org/markup-compatibility/2006" xmlns:mv="urn:schemas-microsoft-com:mac:vml" xmlns:p="http://schemas.openxmlformats.org/presentationml/2006/main" xmlns:c="http://schemas.openxmlformats.org/drawingml/2006/chart" xmlns:dgm="http://schemas.openxmlformats.org/drawingml/2006/diagram" xmlns:o="urn:schemas-microsoft-com:office:office" xmlns:v="urn:schemas-microsoft-com:vml" xmlns:pvml="urn:schemas-microsoft-com:office:powerpoint" xmlns:com="http://schemas.openxmlformats.org/drawingml/2006/compatibility" xmlns:p14="http://schemas.microsoft.com/office/powerpoint/2010/main" xmlns:p15="http://schemas.microsoft.com/office/powerpoint/2012/main"/>
+</file>
+
+<file path=ppt/tableStyles1.xml><?xml version="1.0" encoding="utf-8"?>
+<a:tblStyleLst xmlns:a="http://schemas.openxmlformats.org/drawingml/2006/main" xmlns:r="http://schemas.openxmlformats.org/officeDocument/2006/relationships" def="{0BF13659-D320-42BA-B1B2-618A9FBA4868}">
+  <a:tblStyle styleId="{0BF13659-D320-42BA-B1B2-618A9FBA4868}" styleName="Table_0">
+    <a:wholeTbl>
+      <a:tcTxStyle b="off" i="off">
+        <a:font>
+          <a:latin typeface="Calibri"/>
+          <a:ea typeface="Calibri"/>
+          <a:cs typeface="Calibri"/>
+        </a:font>
+        <a:schemeClr val="dk1"/>
+      </a:tcTxStyle>
+      <a:tcStyle>
+        <a:tcBdr>
+          <a:left>
+            <a:ln cap="flat" cmpd="sng" w="12700">
+              <a:solidFill>
+                <a:schemeClr val="lt1"/>
+              </a:solidFill>
+              <a:prstDash val="solid"/>
+              <a:round/>
+              <a:headEnd len="sm" w="sm" type="none"/>
+              <a:tailEnd len="sm" w="sm" type="none"/>
+            </a:ln>
+          </a:left>
+          <a:right>
+            <a:ln cap="flat" cmpd="sng" w="12700">
+              <a:solidFill>
+                <a:schemeClr val="lt1"/>
+              </a:solidFill>
+              <a:prstDash val="solid"/>
+              <a:round/>
+              <a:headEnd len="sm" w="sm" type="none"/>
+              <a:tailEnd len="sm" w="sm" type="none"/>
+            </a:ln>
+          </a:right>
+          <a:top>
+            <a:ln cap="flat" cmpd="sng" w="12700">
+              <a:solidFill>
+                <a:schemeClr val="lt1"/>
+              </a:solidFill>
+              <a:prstDash val="solid"/>
+              <a:round/>
+              <a:headEnd len="sm" w="sm" type="none"/>
+              <a:tailEnd len="sm" w="sm" type="none"/>
+            </a:ln>
+          </a:top>
+          <a:bottom>
+            <a:ln cap="flat" cmpd="sng" w="12700">
+              <a:solidFill>
+                <a:schemeClr val="lt1"/>
+              </a:solidFill>
+              <a:prstDash val="solid"/>
+              <a:round/>
+              <a:headEnd len="sm" w="sm" type="none"/>
+              <a:tailEnd len="sm" w="sm" type="none"/>
+            </a:ln>
+          </a:bottom>
+          <a:insideH>
+            <a:ln cap="flat" cmpd="sng" w="12700">
+              <a:solidFill>
+                <a:schemeClr val="lt1"/>
+              </a:solidFill>
+              <a:prstDash val="solid"/>
+              <a:round/>
+              <a:headEnd len="sm" w="sm" type="none"/>
+              <a:tailEnd len="sm" w="sm" type="none"/>
+            </a:ln>
+          </a:insideH>
+          <a:insideV>
+            <a:ln cap="flat" cmpd="sng" w="12700">
+              <a:solidFill>
+                <a:schemeClr val="lt1"/>
+              </a:solidFill>
+              <a:prstDash val="solid"/>
+              <a:round/>
+              <a:headEnd len="sm" w="sm" type="none"/>
+              <a:tailEnd len="sm" w="sm" type="none"/>
+            </a:ln>
+          </a:insideV>
+        </a:tcBdr>
+        <a:fill>
+          <a:solidFill>
+            <a:srgbClr val="E8EBF5"/>
+          </a:solidFill>
+        </a:fill>
+      </a:tcStyle>
+    </a:wholeTbl>
+    <a:band1H>
+      <a:tcTxStyle b="off" i="off"/>
+      <a:tcStyle>
+        <a:fill>
+          <a:solidFill>
+            <a:srgbClr val="CDD4EA"/>
+          </a:solidFill>
+        </a:fill>
+      </a:tcStyle>
+    </a:band1H>
+    <a:band2H>
+      <a:tcTxStyle b="off" i="off"/>
+    </a:band2H>
+    <a:band1V>
+      <a:tcTxStyle b="off" i="off"/>
+      <a:tcStyle>
+        <a:fill>
+          <a:solidFill>
+            <a:srgbClr val="CDD4EA"/>
+          </a:solidFill>
+        </a:fill>
+      </a:tcStyle>
+    </a:band1V>
+    <a:band2V>
+      <a:tcTxStyle b="off" i="off"/>
+    </a:band2V>
+    <a:lastCol>
+      <a:tcTxStyle b="on" i="off">
+        <a:font>
+          <a:latin typeface="Calibri"/>
+          <a:ea typeface="Calibri"/>
+          <a:cs typeface="Calibri"/>
+        </a:font>
+        <a:schemeClr val="lt1"/>
+      </a:tcTxStyle>
+      <a:tcStyle>
+        <a:fill>
+          <a:solidFill>
+            <a:schemeClr val="accent1"/>
+          </a:solidFill>
+        </a:fill>
+      </a:tcStyle>
+    </a:lastCol>
+    <a:firstCol>
+      <a:tcTxStyle b="on" i="off">
+        <a:font>
+          <a:latin typeface="Calibri"/>
+          <a:ea typeface="Calibri"/>
+          <a:cs typeface="Calibri"/>
+        </a:font>
+        <a:schemeClr val="lt1"/>
+      </a:tcTxStyle>
+      <a:tcStyle>
+        <a:fill>
+          <a:solidFill>
+            <a:schemeClr val="accent1"/>
+          </a:solidFill>
+        </a:fill>
+      </a:tcStyle>
+    </a:firstCol>
+    <a:lastRow>
+      <a:tcTxStyle b="on" i="off">
+        <a:font>
+          <a:latin typeface="Calibri"/>
+          <a:ea typeface="Calibri"/>
+          <a:cs typeface="Calibri"/>
+        </a:font>
+        <a:schemeClr val="lt1"/>
+      </a:tcTxStyle>
+      <a:tcStyle>
+        <a:tcBdr>
+          <a:top>
+            <a:ln cap="flat" cmpd="sng" w="38100">
+              <a:solidFill>
+                <a:schemeClr val="lt1"/>
+              </a:solidFill>
+              <a:prstDash val="solid"/>
+              <a:round/>
+              <a:headEnd len="sm" w="sm" type="none"/>
+              <a:tailEnd len="sm" w="sm" type="none"/>
+            </a:ln>
+          </a:top>
+        </a:tcBdr>
+        <a:fill>
+          <a:solidFill>
+            <a:schemeClr val="accent1"/>
+          </a:solidFill>
+        </a:fill>
+      </a:tcStyle>
+    </a:lastRow>
+    <a:seCell>
+      <a:tcTxStyle b="off" i="off"/>
+    </a:seCell>
+    <a:swCell>
+      <a:tcTxStyle b="off" i="off"/>
+    </a:swCell>
+    <a:firstRow>
+      <a:tcTxStyle b="on" i="off">
+        <a:font>
+          <a:latin typeface="Calibri"/>
+          <a:ea typeface="Calibri"/>
+          <a:cs typeface="Calibri"/>
+        </a:font>
+        <a:schemeClr val="lt1"/>
+      </a:tcTxStyle>
+      <a:tcStyle>
+        <a:tcBdr>
+          <a:bottom>
+            <a:ln cap="flat" cmpd="sng" w="38100">
+              <a:solidFill>
+                <a:schemeClr val="lt1"/>
+              </a:solidFill>
+              <a:prstDash val="solid"/>
+              <a:round/>
+              <a:headEnd len="sm" w="sm" type="none"/>
+              <a:tailEnd len="sm" w="sm" type="none"/>
+            </a:ln>
+          </a:bottom>
+        </a:tcBdr>
+        <a:fill>
+          <a:solidFill>
+            <a:schemeClr val="accent1"/>
+          </a:solidFill>
+        </a:fill>
+      </a:tcStyle>
+    </a:firstRow>
+    <a:neCell>
+      <a:tcTxStyle b="off" i="off"/>
+    </a:neCell>
+    <a:nwCell>
+      <a:tcTxStyle b="off" i="off"/>
+    </a:nwCell>
+  </a:tblStyle>
+  <a:tblStyle styleId="{13838F1D-6F60-496D-9F46-F8EB30D1F72B}" styleName="Table_0">
+    <a:wholeTbl>
+      <a:tcTxStyle b="off" i="off">
+        <a:font>
+          <a:latin typeface="Calibri"/>
+          <a:ea typeface="Calibri"/>
+          <a:cs typeface="Calibri"/>
+        </a:font>
+        <a:schemeClr val="dk1"/>
+      </a:tcTxStyle>
+      <a:tcStyle>
+        <a:tcBdr>
+          <a:left>
+            <a:ln cap="flat" cmpd="sng" w="12700">
+              <a:solidFill>
+                <a:schemeClr val="lt1"/>
+              </a:solidFill>
+              <a:prstDash val="solid"/>
+              <a:round/>
+              <a:headEnd len="sm" w="sm" type="none"/>
+              <a:tailEnd len="sm" w="sm" type="none"/>
+            </a:ln>
+          </a:left>
+          <a:right>
+            <a:ln cap="flat" cmpd="sng" w="12700">
+              <a:solidFill>
+                <a:schemeClr val="lt1"/>
+              </a:solidFill>
+              <a:prstDash val="solid"/>
+              <a:round/>
+              <a:headEnd len="sm" w="sm" type="none"/>
+              <a:tailEnd len="sm" w="sm" type="none"/>
+            </a:ln>
+          </a:right>
+          <a:top>
+            <a:ln cap="flat" cmpd="sng" w="12700">
+              <a:solidFill>
+                <a:schemeClr val="lt1"/>
+              </a:solidFill>
+              <a:prstDash val="solid"/>
+              <a:round/>
+              <a:headEnd len="sm" w="sm" type="none"/>
+              <a:tailEnd len="sm" w="sm" type="none"/>
+            </a:ln>
+          </a:top>
+          <a:bottom>
+            <a:ln cap="flat" cmpd="sng" w="12700">
+              <a:solidFill>
+                <a:schemeClr val="lt1"/>
+              </a:solidFill>
+              <a:prstDash val="solid"/>
+              <a:round/>
+              <a:headEnd len="sm" w="sm" type="none"/>
+              <a:tailEnd len="sm" w="sm" type="none"/>
+            </a:ln>
+          </a:bottom>
+          <a:insideH>
+            <a:ln cap="flat" cmpd="sng" w="12700">
+              <a:solidFill>
+                <a:schemeClr val="lt1"/>
+              </a:solidFill>
+              <a:prstDash val="solid"/>
+              <a:round/>
+              <a:headEnd len="sm" w="sm" type="none"/>
+              <a:tailEnd len="sm" w="sm" type="none"/>
+            </a:ln>
+          </a:insideH>
+          <a:insideV>
+            <a:ln cap="flat" cmpd="sng" w="12700">
+              <a:solidFill>
+                <a:schemeClr val="lt1"/>
+              </a:solidFill>
+              <a:prstDash val="solid"/>
+              <a:round/>
+              <a:headEnd len="sm" w="sm" type="none"/>
+              <a:tailEnd len="sm" w="sm" type="none"/>
+            </a:ln>
+          </a:insideV>
+        </a:tcBdr>
+        <a:fill>
+          <a:solidFill>
+            <a:srgbClr val="E8EBF5"/>
+          </a:solidFill>
+        </a:fill>
+      </a:tcStyle>
+    </a:wholeTbl>
+    <a:band1H>
+      <a:tcTxStyle/>
+      <a:tcStyle>
+        <a:fill>
+          <a:solidFill>
+            <a:srgbClr val="CDD4EA"/>
+          </a:solidFill>
+        </a:fill>
+      </a:tcStyle>
+    </a:band1H>
+    <a:band2H>
+      <a:tcTxStyle/>
+    </a:band2H>
+    <a:band1V>
+      <a:tcTxStyle/>
+      <a:tcStyle>
+        <a:fill>
+          <a:solidFill>
+            <a:srgbClr val="CDD4EA"/>
+          </a:solidFill>
+        </a:fill>
+      </a:tcStyle>
+    </a:band1V>
+    <a:band2V>
+      <a:tcTxStyle/>
+    </a:band2V>
+    <a:lastCol>
+      <a:tcTxStyle b="on" i="off">
+        <a:font>
+          <a:latin typeface="Calibri"/>
+          <a:ea typeface="Calibri"/>
+          <a:cs typeface="Calibri"/>
+        </a:font>
+        <a:schemeClr val="lt1"/>
+      </a:tcTxStyle>
+      <a:tcStyle>
+        <a:fill>
+          <a:solidFill>
+            <a:schemeClr val="accent1"/>
+          </a:solidFill>
+        </a:fill>
+      </a:tcStyle>
+    </a:lastCol>
+    <a:firstCol>
+      <a:tcTxStyle b="on" i="off">
+        <a:font>
+          <a:latin typeface="Calibri"/>
+          <a:ea typeface="Calibri"/>
+          <a:cs typeface="Calibri"/>
+        </a:font>
+        <a:schemeClr val="lt1"/>
+      </a:tcTxStyle>
+      <a:tcStyle>
+        <a:fill>
+          <a:solidFill>
+            <a:schemeClr val="accent1"/>
+          </a:solidFill>
+        </a:fill>
+      </a:tcStyle>
+    </a:firstCol>
+    <a:lastRow>
+      <a:tcTxStyle b="on" i="off">
+        <a:font>
+          <a:latin typeface="Calibri"/>
+          <a:ea typeface="Calibri"/>
+          <a:cs typeface="Calibri"/>
+        </a:font>
+        <a:schemeClr val="lt1"/>
+      </a:tcTxStyle>
+      <a:tcStyle>
+        <a:tcBdr>
+          <a:top>
+            <a:ln cap="flat" cmpd="sng" w="38100">
+              <a:solidFill>
+                <a:schemeClr val="lt1"/>
+              </a:solidFill>
+              <a:prstDash val="solid"/>
+              <a:round/>
+              <a:headEnd len="sm" w="sm" type="none"/>
+              <a:tailEnd len="sm" w="sm" type="none"/>
+            </a:ln>
+          </a:top>
+        </a:tcBdr>
+        <a:fill>
+          <a:solidFill>
+            <a:schemeClr val="accent1"/>
+          </a:solidFill>
+        </a:fill>
+      </a:tcStyle>
+    </a:lastRow>
+    <a:seCell>
+      <a:tcTxStyle/>
+    </a:seCell>
+    <a:swCell>
+      <a:tcTxStyle/>
+    </a:swCell>
+    <a:firstRow>
+      <a:tcTxStyle b="on" i="off">
+        <a:font>
+          <a:latin typeface="Calibri"/>
+          <a:ea typeface="Calibri"/>
+          <a:cs typeface="Calibri"/>
+        </a:font>
+        <a:schemeClr val="lt1"/>
+      </a:tcTxStyle>
+      <a:tcStyle>
+        <a:tcBdr>
+          <a:bottom>
+            <a:ln cap="flat" cmpd="sng" w="38100">
+              <a:solidFill>
+                <a:schemeClr val="lt1"/>
+              </a:solidFill>
+              <a:prstDash val="solid"/>
+              <a:round/>
+              <a:headEnd len="sm" w="sm" type="none"/>
+              <a:tailEnd len="sm" w="sm" type="none"/>
+            </a:ln>
+          </a:bottom>
+        </a:tcBdr>
+        <a:fill>
+          <a:solidFill>
+            <a:schemeClr val="accent1"/>
+          </a:solidFill>
+        </a:fill>
+      </a:tcStyle>
+    </a:firstRow>
+    <a:neCell>
+      <a:tcTxStyle/>
+    </a:neCell>
+    <a:nwCell>
+      <a:tcTxStyle/>
+    </a:nwCell>
+  </a:tblStyle>
+</a:tblStyleLst>
+</file>
+
+<file path=ppt/viewProps1.xml><?xml version="1.0" encoding="utf-8"?>
+<p:viewPr xmlns:a="http://schemas.openxmlformats.org/drawingml/2006/main" xmlns:r="http://schemas.openxmlformats.org/officeDocument/2006/relationships" xmlns:mc="http://schemas.openxmlformats.org/markup-compatibility/2006" xmlns:mv="urn:schemas-microsoft-com:mac:vml" xmlns:p="http://schemas.openxmlformats.org/presentationml/2006/main" xmlns:c="http://schemas.openxmlformats.org/drawingml/2006/chart" xmlns:dgm="http://schemas.openxmlformats.org/drawingml/2006/diagram" xmlns:o="urn:schemas-microsoft-com:office:office" xmlns:v="urn:schemas-microsoft-com:vml" xmlns:pvml="urn:schemas-microsoft-com:office:powerpoint" xmlns:com="http://schemas.openxmlformats.org/drawingml/2006/compatibility" xmlns:p14="http://schemas.microsoft.com/office/powerpoint/2010/main" xmlns:p15="http://schemas.microsoft.com/office/powerpoint/2012/main" showComments="0">
+  <p:slideViewPr>
+    <p:cSldViewPr snapToGrid="0">
+      <p:cViewPr varScale="1">
+        <p:scale>
+          <a:sx n="100" d="100"/>
+          <a:sy n="100" d="100"/>
+        </p:scale>
+        <p:origin x="0" y="0"/>
+      </p:cViewPr>
+      <p:guideLst>
+        <p:guide pos="2160" orient="horz"/>
+        <p:guide pos="3840"/>
+      </p:guideLst>
+    </p:cSldViewPr>
+  </p:slideViewPr>
+</p:viewPr>
 </file>
 
 <file path=ppt/notesMasters/notesMaster1.xml><?xml version="1.0" encoding="utf-8"?>
@@ -12112,7 +12576,7 @@
   <p:cSld>
     <p:spTree>
       <p:nvGrpSpPr>
-        <p:cNvPr id="98" name="Shape 98"/>
+        <p:cNvPr id="110" name="Shape 110"/>
         <p:cNvGrpSpPr/>
         <p:nvPr/>
       </p:nvGrpSpPr>
@@ -12126,7 +12590,7 @@
       </p:grpSpPr>
       <p:sp>
         <p:nvSpPr>
-          <p:cNvPr id="99" name="Google Shape;99;p3"/>
+          <p:cNvPr id="111" name="Google Shape;111;p1"/>
           <p:cNvSpPr txBox="1"/>
           <p:nvPr>
             <p:ph type="title"/>
@@ -12135,7 +12599,7 @@
         <p:spPr>
           <a:xfrm>
             <a:off x="838200" y="365125"/>
-            <a:ext cx="10515600" cy="1325563"/>
+            <a:ext cx="10515600" cy="1325700"/>
           </a:xfrm>
           <a:prstGeom prst="rect">
             <a:avLst/>
@@ -12178,7 +12642,7 @@
       </p:sp>
       <p:graphicFrame>
         <p:nvGraphicFramePr>
-          <p:cNvPr id="100" name="Google Shape;100;p3"/>
+          <p:cNvPr id="112" name="Google Shape;112;p1"/>
           <p:cNvGraphicFramePr/>
           <p:nvPr/>
         </p:nvGraphicFramePr>
@@ -12191,7 +12655,7 @@
             <a:tbl>
               <a:tblPr bandRow="1" firstCol="1">
                 <a:noFill/>
-                <a:tableStyleId>{13838F1D-6F60-496D-9F46-F8EB30D1F72B}</a:tableStyleId>
+                <a:tableStyleId>{0BF13659-D320-42BA-B1B2-618A9FBA4868}</a:tableStyleId>
               </a:tblPr>
               <a:tblGrid>
                 <a:gridCol w="2866050"/>
@@ -12204,19 +12668,28 @@
                     <a:lstStyle/>
                     <a:p>
                       <a:pPr indent="0" lvl="0" marL="0" marR="0" rtl="0" algn="l">
+                        <a:lnSpc>
+                          <a:spcPct val="100000"/>
+                        </a:lnSpc>
                         <a:spcBef>
                           <a:spcPts val="0"/>
                         </a:spcBef>
                         <a:spcAft>
                           <a:spcPts val="0"/>
                         </a:spcAft>
+                        <a:buClr>
+                          <a:srgbClr val="000000"/>
+                        </a:buClr>
+                        <a:buSzPts val="1800"/>
+                        <a:buFont typeface="Arial"/>
                         <a:buNone/>
+                        <a:defRPr sz="1400" u="none" cap="none" strike="noStrike"/>
                       </a:pPr>
                       <a:r>
-                        <a:rPr lang="it-IT" sz="1800"/>
+                        <a:rPr lang="it-IT" sz="1800" u="none" cap="none" strike="noStrike"/>
                         <a:t>Trigger</a:t>
                       </a:r>
-                      <a:endParaRPr sz="1800"/>
+                      <a:endParaRPr sz="1800" u="none" cap="none" strike="noStrike"/>
                     </a:p>
                   </a:txBody>
                   <a:tcPr marT="45725" marB="45725" marR="91450" marL="91450"/>
@@ -12227,27 +12700,32 @@
                     <a:lstStyle/>
                     <a:p>
                       <a:pPr indent="0" lvl="0" marL="0" marR="0" rtl="0" algn="l">
+                        <a:lnSpc>
+                          <a:spcPct val="100000"/>
+                        </a:lnSpc>
                         <a:spcBef>
                           <a:spcPts val="0"/>
                         </a:spcBef>
                         <a:spcAft>
                           <a:spcPts val="0"/>
                         </a:spcAft>
+                        <a:buClr>
+                          <a:srgbClr val="000000"/>
+                        </a:buClr>
+                        <a:buSzPts val="1800"/>
+                        <a:buFont typeface="Arial"/>
                         <a:buNone/>
+                        <a:defRPr sz="1400" u="none" cap="none" strike="noStrike"/>
                       </a:pPr>
                       <a:r>
-                        <a:rPr lang="it-IT" sz="1800"/>
-                        <a:t>Click</a:t>
+                        <a:rPr lang="it-IT" sz="1800" u="none" cap="none" strike="noStrike"/>
+                        <a:t>Click </a:t>
                       </a:r>
                       <a:r>
                         <a:rPr lang="it-IT" sz="1800"/>
-                        <a:t> su</a:t>
+                        <a:t>su manda segnalazione</a:t>
                       </a:r>
-                      <a:r>
-                        <a:rPr lang="it-IT" sz="1800"/>
-                        <a:t> registrazione </a:t>
-                      </a:r>
-                      <a:endParaRPr sz="1800"/>
+                      <a:endParaRPr sz="1800" u="none" cap="none" strike="noStrike"/>
                     </a:p>
                   </a:txBody>
                   <a:tcPr marT="45725" marB="45725" marR="91450" marL="91450"/>
@@ -12260,19 +12738,28 @@
                     <a:lstStyle/>
                     <a:p>
                       <a:pPr indent="0" lvl="0" marL="0" marR="0" rtl="0" algn="l">
+                        <a:lnSpc>
+                          <a:spcPct val="100000"/>
+                        </a:lnSpc>
                         <a:spcBef>
                           <a:spcPts val="0"/>
                         </a:spcBef>
                         <a:spcAft>
                           <a:spcPts val="0"/>
                         </a:spcAft>
+                        <a:buClr>
+                          <a:srgbClr val="000000"/>
+                        </a:buClr>
+                        <a:buSzPts val="1800"/>
+                        <a:buFont typeface="Arial"/>
                         <a:buNone/>
+                        <a:defRPr sz="1400" u="none" cap="none" strike="noStrike"/>
                       </a:pPr>
                       <a:r>
-                        <a:rPr lang="it-IT" sz="1800"/>
+                        <a:rPr lang="it-IT" sz="1800" u="none" cap="none" strike="noStrike"/>
                         <a:t>Frequenza di utilizzo</a:t>
                       </a:r>
-                      <a:endParaRPr/>
+                      <a:endParaRPr sz="1400" u="none" cap="none" strike="noStrike"/>
                     </a:p>
                   </a:txBody>
                   <a:tcPr marT="45725" marB="45725" marR="91450" marL="91450"/>
@@ -12283,23 +12770,28 @@
                     <a:lstStyle/>
                     <a:p>
                       <a:pPr indent="0" lvl="0" marL="0" marR="0" rtl="0" algn="l">
+                        <a:lnSpc>
+                          <a:spcPct val="100000"/>
+                        </a:lnSpc>
                         <a:spcBef>
                           <a:spcPts val="0"/>
                         </a:spcBef>
                         <a:spcAft>
                           <a:spcPts val="0"/>
                         </a:spcAft>
+                        <a:buClr>
+                          <a:srgbClr val="000000"/>
+                        </a:buClr>
+                        <a:buSzPts val="1800"/>
+                        <a:buFont typeface="Arial"/>
                         <a:buNone/>
+                        <a:defRPr sz="1400" u="none" cap="none" strike="noStrike"/>
                       </a:pPr>
                       <a:r>
                         <a:rPr lang="it-IT" sz="1800"/>
-                        <a:t>1</a:t>
+                        <a:t>Rare</a:t>
                       </a:r>
-                      <a:r>
-                        <a:rPr lang="it-IT" sz="1800"/>
-                        <a:t> volta</a:t>
-                      </a:r>
-                      <a:endParaRPr sz="1800"/>
+                      <a:endParaRPr sz="1800" u="none" cap="none" strike="noStrike"/>
                     </a:p>
                   </a:txBody>
                   <a:tcPr marT="45725" marB="45725" marR="91450" marL="91450"/>
@@ -12312,19 +12804,28 @@
                     <a:lstStyle/>
                     <a:p>
                       <a:pPr indent="0" lvl="0" marL="0" marR="0" rtl="0" algn="l">
+                        <a:lnSpc>
+                          <a:spcPct val="100000"/>
+                        </a:lnSpc>
                         <a:spcBef>
                           <a:spcPts val="0"/>
                         </a:spcBef>
                         <a:spcAft>
                           <a:spcPts val="0"/>
                         </a:spcAft>
+                        <a:buClr>
+                          <a:srgbClr val="000000"/>
+                        </a:buClr>
+                        <a:buSzPts val="1800"/>
+                        <a:buFont typeface="Arial"/>
                         <a:buNone/>
+                        <a:defRPr sz="1400" u="none" cap="none" strike="noStrike"/>
                       </a:pPr>
                       <a:r>
-                        <a:rPr lang="it-IT" sz="1800"/>
+                        <a:rPr lang="it-IT" sz="1800" u="none" cap="none" strike="noStrike"/>
                         <a:t>Benefici organizzativi</a:t>
                       </a:r>
-                      <a:endParaRPr/>
+                      <a:endParaRPr sz="1400" u="none" cap="none" strike="noStrike"/>
                     </a:p>
                   </a:txBody>
                   <a:tcPr marT="45725" marB="45725" marR="91450" marL="91450"/>
@@ -12335,18 +12836,27 @@
                     <a:lstStyle/>
                     <a:p>
                       <a:pPr indent="0" lvl="0" marL="0" marR="0" rtl="0" algn="l">
+                        <a:lnSpc>
+                          <a:spcPct val="100000"/>
+                        </a:lnSpc>
                         <a:spcBef>
                           <a:spcPts val="0"/>
                         </a:spcBef>
                         <a:spcAft>
                           <a:spcPts val="0"/>
                         </a:spcAft>
+                        <a:buClr>
+                          <a:srgbClr val="000000"/>
+                        </a:buClr>
+                        <a:buSzPts val="1800"/>
+                        <a:buFont typeface="Arial"/>
                         <a:buNone/>
+                        <a:defRPr sz="1400" u="none" cap="none" strike="noStrike"/>
                       </a:pPr>
                       <a:r>
                         <a:t/>
                       </a:r>
-                      <a:endParaRPr sz="1800"/>
+                      <a:endParaRPr sz="1800" u="none" cap="none" strike="noStrike"/>
                     </a:p>
                   </a:txBody>
                   <a:tcPr marT="45725" marB="45725" marR="91450" marL="91450"/>
@@ -12359,19 +12869,28 @@
                     <a:lstStyle/>
                     <a:p>
                       <a:pPr indent="0" lvl="0" marL="0" marR="0" rtl="0" algn="l">
+                        <a:lnSpc>
+                          <a:spcPct val="100000"/>
+                        </a:lnSpc>
                         <a:spcBef>
                           <a:spcPts val="0"/>
                         </a:spcBef>
                         <a:spcAft>
                           <a:spcPts val="0"/>
                         </a:spcAft>
+                        <a:buClr>
+                          <a:srgbClr val="000000"/>
+                        </a:buClr>
+                        <a:buSzPts val="1800"/>
+                        <a:buFont typeface="Arial"/>
                         <a:buNone/>
+                        <a:defRPr sz="1400" u="none" cap="none" strike="noStrike"/>
                       </a:pPr>
                       <a:r>
-                        <a:rPr lang="it-IT" sz="1800"/>
+                        <a:rPr lang="it-IT" sz="1800" u="none" cap="none" strike="noStrike"/>
                         <a:t>Attore principale</a:t>
                       </a:r>
-                      <a:endParaRPr/>
+                      <a:endParaRPr sz="1400" u="none" cap="none" strike="noStrike"/>
                     </a:p>
                   </a:txBody>
                   <a:tcPr marT="45725" marB="45725" marR="91450" marL="91450"/>
@@ -12382,19 +12901,28 @@
                     <a:lstStyle/>
                     <a:p>
                       <a:pPr indent="0" lvl="0" marL="0" marR="0" rtl="0" algn="l">
+                        <a:lnSpc>
+                          <a:spcPct val="100000"/>
+                        </a:lnSpc>
                         <a:spcBef>
                           <a:spcPts val="0"/>
                         </a:spcBef>
                         <a:spcAft>
                           <a:spcPts val="0"/>
                         </a:spcAft>
+                        <a:buClr>
+                          <a:srgbClr val="000000"/>
+                        </a:buClr>
+                        <a:buSzPts val="1800"/>
+                        <a:buFont typeface="Arial"/>
                         <a:buNone/>
+                        <a:defRPr sz="1400" u="none" cap="none" strike="noStrike"/>
                       </a:pPr>
                       <a:r>
                         <a:rPr lang="it-IT" sz="1800"/>
-                        <a:t>UtenteAnonimo</a:t>
+                        <a:t>Proprietario</a:t>
                       </a:r>
-                      <a:endParaRPr sz="1800"/>
+                      <a:endParaRPr sz="1800" u="none" cap="none" strike="noStrike"/>
                     </a:p>
                   </a:txBody>
                   <a:tcPr marT="45725" marB="45725" marR="91450" marL="91450"/>
@@ -12407,19 +12935,28 @@
                     <a:lstStyle/>
                     <a:p>
                       <a:pPr indent="0" lvl="0" marL="0" marR="0" rtl="0" algn="l">
+                        <a:lnSpc>
+                          <a:spcPct val="100000"/>
+                        </a:lnSpc>
                         <a:spcBef>
                           <a:spcPts val="0"/>
                         </a:spcBef>
                         <a:spcAft>
                           <a:spcPts val="0"/>
                         </a:spcAft>
+                        <a:buClr>
+                          <a:srgbClr val="000000"/>
+                        </a:buClr>
+                        <a:buSzPts val="1800"/>
+                        <a:buFont typeface="Arial"/>
                         <a:buNone/>
+                        <a:defRPr sz="1400" u="none" cap="none" strike="noStrike"/>
                       </a:pPr>
                       <a:r>
-                        <a:rPr lang="it-IT" sz="1800"/>
+                        <a:rPr lang="it-IT" sz="1800" u="none" cap="none" strike="noStrike"/>
                         <a:t>Attori secondari</a:t>
                       </a:r>
-                      <a:endParaRPr/>
+                      <a:endParaRPr sz="1400" u="none" cap="none" strike="noStrike"/>
                     </a:p>
                   </a:txBody>
                   <a:tcPr marT="45725" marB="45725" marR="91450" marL="91450"/>
@@ -12430,19 +12967,28 @@
                     <a:lstStyle/>
                     <a:p>
                       <a:pPr indent="0" lvl="0" marL="0" marR="0" rtl="0" algn="l">
+                        <a:lnSpc>
+                          <a:spcPct val="100000"/>
+                        </a:lnSpc>
                         <a:spcBef>
                           <a:spcPts val="0"/>
                         </a:spcBef>
                         <a:spcAft>
                           <a:spcPts val="0"/>
                         </a:spcAft>
+                        <a:buClr>
+                          <a:srgbClr val="000000"/>
+                        </a:buClr>
+                        <a:buSzPts val="1800"/>
+                        <a:buFont typeface="Arial"/>
                         <a:buNone/>
+                        <a:defRPr sz="1400" u="none" cap="none" strike="noStrike"/>
                       </a:pPr>
                       <a:r>
-                        <a:rPr lang="it-IT" sz="1800"/>
+                        <a:rPr lang="it-IT" sz="1800" u="none" cap="none" strike="noStrike"/>
                         <a:t>Sistema</a:t>
                       </a:r>
-                      <a:endParaRPr sz="1800"/>
+                      <a:endParaRPr sz="1800" u="none" cap="none" strike="noStrike"/>
                     </a:p>
                   </a:txBody>
                   <a:tcPr marT="45725" marB="45725" marR="91450" marL="91450"/>
@@ -12455,19 +13001,28 @@
                     <a:lstStyle/>
                     <a:p>
                       <a:pPr indent="0" lvl="0" marL="0" marR="0" rtl="0" algn="l">
+                        <a:lnSpc>
+                          <a:spcPct val="100000"/>
+                        </a:lnSpc>
                         <a:spcBef>
                           <a:spcPts val="0"/>
                         </a:spcBef>
                         <a:spcAft>
                           <a:spcPts val="0"/>
                         </a:spcAft>
+                        <a:buClr>
+                          <a:srgbClr val="000000"/>
+                        </a:buClr>
+                        <a:buSzPts val="1800"/>
+                        <a:buFont typeface="Arial"/>
                         <a:buNone/>
+                        <a:defRPr sz="1400" u="none" cap="none" strike="noStrike"/>
                       </a:pPr>
                       <a:r>
-                        <a:rPr lang="it-IT" sz="1800"/>
+                        <a:rPr lang="it-IT" sz="1800" u="none" cap="none" strike="noStrike"/>
                         <a:t>Pre condizioni</a:t>
                       </a:r>
-                      <a:endParaRPr/>
+                      <a:endParaRPr sz="1400" u="none" cap="none" strike="noStrike"/>
                     </a:p>
                   </a:txBody>
                   <a:tcPr marT="45725" marB="45725" marR="91450" marL="91450"/>
@@ -12478,19 +13033,32 @@
                     <a:lstStyle/>
                     <a:p>
                       <a:pPr indent="0" lvl="0" marL="0" marR="0" rtl="0" algn="l">
+                        <a:lnSpc>
+                          <a:spcPct val="100000"/>
+                        </a:lnSpc>
                         <a:spcBef>
                           <a:spcPts val="0"/>
                         </a:spcBef>
                         <a:spcAft>
                           <a:spcPts val="0"/>
                         </a:spcAft>
+                        <a:buClr>
+                          <a:srgbClr val="000000"/>
+                        </a:buClr>
+                        <a:buSzPts val="1800"/>
+                        <a:buFont typeface="Arial"/>
                         <a:buNone/>
+                        <a:defRPr sz="1400" u="none" cap="none" strike="noStrike"/>
                       </a:pPr>
                       <a:r>
+                        <a:rPr lang="it-IT" sz="1800" u="none" cap="none" strike="noStrike"/>
+                        <a:t>Schermata </a:t>
+                      </a:r>
+                      <a:r>
                         <a:rPr lang="it-IT" sz="1800"/>
-                        <a:t>Schermata login</a:t>
+                        <a:t>switching</a:t>
                       </a:r>
-                      <a:endParaRPr sz="1800"/>
+                      <a:endParaRPr sz="1800" u="none" cap="none" strike="noStrike"/>
                     </a:p>
                   </a:txBody>
                   <a:tcPr marT="45725" marB="45725" marR="91450" marL="91450"/>
@@ -12503,19 +13071,28 @@
                     <a:lstStyle/>
                     <a:p>
                       <a:pPr indent="0" lvl="0" marL="0" marR="0" rtl="0" algn="l">
+                        <a:lnSpc>
+                          <a:spcPct val="100000"/>
+                        </a:lnSpc>
                         <a:spcBef>
                           <a:spcPts val="0"/>
                         </a:spcBef>
                         <a:spcAft>
                           <a:spcPts val="0"/>
                         </a:spcAft>
+                        <a:buClr>
+                          <a:srgbClr val="000000"/>
+                        </a:buClr>
+                        <a:buSzPts val="1800"/>
+                        <a:buFont typeface="Arial"/>
                         <a:buNone/>
+                        <a:defRPr sz="1400" u="none" cap="none" strike="noStrike"/>
                       </a:pPr>
                       <a:r>
-                        <a:rPr lang="it-IT" sz="1800"/>
+                        <a:rPr lang="it-IT" sz="1800" u="none" cap="none" strike="noStrike"/>
                         <a:t>Post condizioni</a:t>
                       </a:r>
-                      <a:endParaRPr/>
+                      <a:endParaRPr sz="1400" u="none" cap="none" strike="noStrike"/>
                     </a:p>
                   </a:txBody>
                   <a:tcPr marT="45725" marB="45725" marR="91450" marL="91450"/>
@@ -12526,19 +13103,28 @@
                     <a:lstStyle/>
                     <a:p>
                       <a:pPr indent="0" lvl="0" marL="0" marR="0" rtl="0" algn="l">
+                        <a:lnSpc>
+                          <a:spcPct val="100000"/>
+                        </a:lnSpc>
                         <a:spcBef>
                           <a:spcPts val="0"/>
                         </a:spcBef>
                         <a:spcAft>
                           <a:spcPts val="0"/>
                         </a:spcAft>
+                        <a:buClr>
+                          <a:srgbClr val="000000"/>
+                        </a:buClr>
+                        <a:buSzPts val="1800"/>
+                        <a:buFont typeface="Arial"/>
                         <a:buNone/>
+                        <a:defRPr sz="1400" u="none" cap="none" strike="noStrike"/>
                       </a:pPr>
                       <a:r>
                         <a:rPr lang="it-IT" sz="1800"/>
-                        <a:t>Utente sul sito web, pagina di registrazione</a:t>
+                        <a:t>Schermata motivo segnalazione </a:t>
                       </a:r>
-                      <a:endParaRPr sz="1800"/>
+                      <a:endParaRPr sz="1800" u="none" cap="none" strike="noStrike"/>
                     </a:p>
                   </a:txBody>
                   <a:tcPr marT="45725" marB="45725" marR="91450" marL="91450"/>
@@ -12550,7 +13136,7 @@
       </p:graphicFrame>
       <p:pic>
         <p:nvPicPr>
-          <p:cNvPr descr="Alta tensione" id="101" name="Google Shape;101;p3"/>
+          <p:cNvPr descr="Alta tensione" id="113" name="Google Shape;113;p1"/>
           <p:cNvPicPr preferRelativeResize="0"/>
           <p:nvPr/>
         </p:nvPicPr>
@@ -12588,7 +13174,7 @@
   <p:cSld>
     <p:spTree>
       <p:nvGrpSpPr>
-        <p:cNvPr id="105" name="Shape 105"/>
+        <p:cNvPr id="114" name="Shape 114"/>
         <p:cNvGrpSpPr/>
         <p:nvPr/>
       </p:nvGrpSpPr>
@@ -12602,7 +13188,7 @@
       </p:grpSpPr>
       <p:sp>
         <p:nvSpPr>
-          <p:cNvPr id="106" name="Google Shape;106;p4"/>
+          <p:cNvPr id="115" name="Google Shape;115;p2"/>
           <p:cNvSpPr txBox="1"/>
           <p:nvPr>
             <p:ph type="title"/>
@@ -12611,7 +13197,7 @@
         <p:spPr>
           <a:xfrm>
             <a:off x="838200" y="365125"/>
-            <a:ext cx="10515600" cy="1325563"/>
+            <a:ext cx="10515600" cy="1325700"/>
           </a:xfrm>
           <a:prstGeom prst="rect">
             <a:avLst/>
@@ -12654,7 +13240,7 @@
       </p:sp>
       <p:graphicFrame>
         <p:nvGraphicFramePr>
-          <p:cNvPr id="107" name="Google Shape;107;p4"/>
+          <p:cNvPr id="116" name="Google Shape;116;p2"/>
           <p:cNvGraphicFramePr/>
           <p:nvPr/>
         </p:nvGraphicFramePr>
@@ -12667,7 +13253,7 @@
             <a:tbl>
               <a:tblPr bandRow="1" firstCol="1">
                 <a:noFill/>
-                <a:tableStyleId>{13838F1D-6F60-496D-9F46-F8EB30D1F72B}</a:tableStyleId>
+                <a:tableStyleId>{0BF13659-D320-42BA-B1B2-618A9FBA4868}</a:tableStyleId>
               </a:tblPr>
               <a:tblGrid>
                 <a:gridCol w="2688775"/>
@@ -12680,19 +13266,28 @@
                     <a:lstStyle/>
                     <a:p>
                       <a:pPr indent="0" lvl="0" marL="0" marR="0" rtl="0" algn="l">
+                        <a:lnSpc>
+                          <a:spcPct val="100000"/>
+                        </a:lnSpc>
                         <a:spcBef>
                           <a:spcPts val="0"/>
                         </a:spcBef>
                         <a:spcAft>
                           <a:spcPts val="0"/>
                         </a:spcAft>
+                        <a:buClr>
+                          <a:srgbClr val="000000"/>
+                        </a:buClr>
+                        <a:buSzPts val="1800"/>
+                        <a:buFont typeface="Arial"/>
                         <a:buNone/>
+                        <a:defRPr sz="1400" u="none" cap="none" strike="noStrike"/>
                       </a:pPr>
                       <a:r>
-                        <a:rPr lang="it-IT" sz="1800"/>
+                        <a:rPr lang="it-IT" sz="1800" u="none" cap="none" strike="noStrike"/>
                         <a:t>Flusso principale</a:t>
                       </a:r>
-                      <a:endParaRPr/>
+                      <a:endParaRPr sz="1400" u="none" cap="none" strike="noStrike"/>
                     </a:p>
                   </a:txBody>
                   <a:tcPr marT="45725" marB="45725" marR="91450" marL="91450"/>
@@ -12703,6 +13298,9 @@
                     <a:lstStyle/>
                     <a:p>
                       <a:pPr indent="0" lvl="0" marL="0" marR="0" rtl="0" algn="l">
+                        <a:lnSpc>
+                          <a:spcPct val="100000"/>
+                        </a:lnSpc>
                         <a:spcBef>
                           <a:spcPts val="0"/>
                         </a:spcBef>
@@ -12715,16 +13313,50 @@
                         <a:buSzPts val="1800"/>
                         <a:buFont typeface="Calibri"/>
                         <a:buNone/>
+                        <a:defRPr sz="1400" u="none" cap="none" strike="noStrike"/>
                       </a:pPr>
                       <a:r>
-                        <a:rPr lang="it-IT" sz="1800"/>
-                        <a:t>1.Click</a:t>
+                        <a:rPr lang="it-IT" sz="1800" u="none" cap="none" strike="noStrike"/>
+                        <a:t>1.Click </a:t>
                       </a:r>
                       <a:r>
                         <a:rPr lang="it-IT" sz="1800"/>
-                        <a:t> link registrazione, 2.Apre pagina web di registrazione</a:t>
+                        <a:t>su pulsante manda segnalazione </a:t>
                       </a:r>
-                      <a:endParaRPr sz="1800"/>
+                      <a:r>
+                        <a:rPr lang="it-IT" sz="1800" u="none" cap="none" strike="noStrike"/>
+                        <a:t>, </a:t>
+                      </a:r>
+                      <a:endParaRPr sz="1800" u="none" cap="none" strike="noStrike"/>
+                    </a:p>
+                    <a:p>
+                      <a:pPr indent="0" lvl="0" marL="0" marR="0" rtl="0" algn="l">
+                        <a:lnSpc>
+                          <a:spcPct val="100000"/>
+                        </a:lnSpc>
+                        <a:spcBef>
+                          <a:spcPts val="0"/>
+                        </a:spcBef>
+                        <a:spcAft>
+                          <a:spcPts val="0"/>
+                        </a:spcAft>
+                        <a:buClr>
+                          <a:schemeClr val="dk1"/>
+                        </a:buClr>
+                        <a:buSzPts val="1800"/>
+                        <a:buFont typeface="Calibri"/>
+                        <a:buNone/>
+                        <a:defRPr sz="1400" u="none" cap="none" strike="noStrike"/>
+                      </a:pPr>
+                      <a:r>
+                        <a:rPr lang="it-IT" sz="1800" u="none" cap="none" strike="noStrike"/>
+                        <a:t>2.Apre </a:t>
+                      </a:r>
+                      <a:r>
+                        <a:rPr lang="it-IT" sz="1800"/>
+                        <a:t>schermata segnalazione </a:t>
+                      </a:r>
+                      <a:endParaRPr sz="1800" u="none" cap="none" strike="noStrike"/>
                     </a:p>
                   </a:txBody>
                   <a:tcPr marT="45725" marB="45725" marR="91450" marL="91450"/>
@@ -12737,19 +13369,28 @@
                     <a:lstStyle/>
                     <a:p>
                       <a:pPr indent="0" lvl="0" marL="0" marR="0" rtl="0" algn="l">
+                        <a:lnSpc>
+                          <a:spcPct val="100000"/>
+                        </a:lnSpc>
                         <a:spcBef>
                           <a:spcPts val="0"/>
                         </a:spcBef>
                         <a:spcAft>
                           <a:spcPts val="0"/>
                         </a:spcAft>
+                        <a:buClr>
+                          <a:srgbClr val="000000"/>
+                        </a:buClr>
+                        <a:buSzPts val="1800"/>
+                        <a:buFont typeface="Arial"/>
                         <a:buNone/>
+                        <a:defRPr sz="1400" u="none" cap="none" strike="noStrike"/>
                       </a:pPr>
                       <a:r>
-                        <a:rPr lang="it-IT" sz="1800"/>
+                        <a:rPr lang="it-IT" sz="1800" u="none" cap="none" strike="noStrike"/>
                         <a:t>Flusso Alternativo 1</a:t>
                       </a:r>
-                      <a:endParaRPr/>
+                      <a:endParaRPr sz="1400" u="none" cap="none" strike="noStrike"/>
                     </a:p>
                   </a:txBody>
                   <a:tcPr marT="45725" marB="45725" marR="91450" marL="91450"/>
@@ -12760,18 +13401,27 @@
                     <a:lstStyle/>
                     <a:p>
                       <a:pPr indent="0" lvl="0" marL="0" marR="0" rtl="0" algn="l">
+                        <a:lnSpc>
+                          <a:spcPct val="100000"/>
+                        </a:lnSpc>
                         <a:spcBef>
                           <a:spcPts val="0"/>
                         </a:spcBef>
                         <a:spcAft>
                           <a:spcPts val="0"/>
                         </a:spcAft>
+                        <a:buClr>
+                          <a:srgbClr val="000000"/>
+                        </a:buClr>
+                        <a:buSzPts val="1800"/>
+                        <a:buFont typeface="Arial"/>
                         <a:buNone/>
+                        <a:defRPr sz="1400" u="none" cap="none" strike="noStrike"/>
                       </a:pPr>
                       <a:r>
                         <a:t/>
                       </a:r>
-                      <a:endParaRPr sz="1800"/>
+                      <a:endParaRPr sz="1800" u="none" cap="none" strike="noStrike"/>
                     </a:p>
                   </a:txBody>
                   <a:tcPr marT="45725" marB="45725" marR="91450" marL="91450"/>
@@ -12784,19 +13434,28 @@
                     <a:lstStyle/>
                     <a:p>
                       <a:pPr indent="0" lvl="0" marL="0" marR="0" rtl="0" algn="l">
+                        <a:lnSpc>
+                          <a:spcPct val="100000"/>
+                        </a:lnSpc>
                         <a:spcBef>
                           <a:spcPts val="0"/>
                         </a:spcBef>
                         <a:spcAft>
                           <a:spcPts val="0"/>
                         </a:spcAft>
+                        <a:buClr>
+                          <a:srgbClr val="000000"/>
+                        </a:buClr>
+                        <a:buSzPts val="1800"/>
+                        <a:buFont typeface="Arial"/>
                         <a:buNone/>
+                        <a:defRPr sz="1400" u="none" cap="none" strike="noStrike"/>
                       </a:pPr>
                       <a:r>
-                        <a:rPr lang="it-IT" sz="1800"/>
+                        <a:rPr lang="it-IT" sz="1800" u="none" cap="none" strike="noStrike"/>
                         <a:t>Flusso eccezionale 1</a:t>
                       </a:r>
-                      <a:endParaRPr/>
+                      <a:endParaRPr sz="1400" u="none" cap="none" strike="noStrike"/>
                     </a:p>
                   </a:txBody>
                   <a:tcPr marT="45725" marB="45725" marR="91450" marL="91450"/>
@@ -12807,18 +13466,27 @@
                     <a:lstStyle/>
                     <a:p>
                       <a:pPr indent="0" lvl="0" marL="0" marR="0" rtl="0" algn="l">
+                        <a:lnSpc>
+                          <a:spcPct val="100000"/>
+                        </a:lnSpc>
                         <a:spcBef>
                           <a:spcPts val="0"/>
                         </a:spcBef>
                         <a:spcAft>
                           <a:spcPts val="0"/>
                         </a:spcAft>
+                        <a:buClr>
+                          <a:srgbClr val="000000"/>
+                        </a:buClr>
+                        <a:buSzPts val="1800"/>
+                        <a:buFont typeface="Arial"/>
                         <a:buNone/>
+                        <a:defRPr sz="1400" u="none" cap="none" strike="noStrike"/>
                       </a:pPr>
                       <a:r>
                         <a:t/>
                       </a:r>
-                      <a:endParaRPr sz="1800"/>
+                      <a:endParaRPr sz="1800" u="none" cap="none" strike="noStrike"/>
                     </a:p>
                   </a:txBody>
                   <a:tcPr marT="45725" marB="45725" marR="91450" marL="91450"/>
@@ -12830,7 +13498,7 @@
       </p:graphicFrame>
       <p:pic>
         <p:nvPicPr>
-          <p:cNvPr descr="Flusso di lavoro" id="108" name="Google Shape;108;p4"/>
+          <p:cNvPr descr="Flusso di lavoro" id="117" name="Google Shape;117;p2"/>
           <p:cNvPicPr preferRelativeResize="0"/>
           <p:nvPr/>
         </p:nvPicPr>

</xml_diff>